<commit_message>
Smart Invest App Added
Added Capstone Final project Smart Invest App
</commit_message>
<xml_diff>
--- a/Montanaro Healthcare Business Case App/Report & Slides/Montanaro Hospital.pptx
+++ b/Montanaro Healthcare Business Case App/Report & Slides/Montanaro Hospital.pptx
@@ -17853,7 +17853,7 @@
           </a:xfrm>
           <a:prstGeom prst="arc">
             <a:avLst>
-              <a:gd name="adj1" fmla="val 16224996"/>
+              <a:gd name="adj1" fmla="val 16179240"/>
               <a:gd name="adj2" fmla="val 0"/>
             </a:avLst>
           </a:prstGeom>
@@ -17900,7 +17900,7 @@
         </p:nvSpPr>
         <p:spPr>
           <a:xfrm>
-            <a:off x="1646693" y="5684649"/>
+            <a:off x="2820768" y="6760214"/>
             <a:ext cx="971873" cy="898902"/>
           </a:xfrm>
           <a:prstGeom prst="ellipse">
@@ -18494,7 +18494,7 @@
         </p:nvSpPr>
         <p:spPr>
           <a:xfrm>
-            <a:off x="1758333" y="5816073"/>
+            <a:off x="2932408" y="6886499"/>
             <a:ext cx="748592" cy="646331"/>
           </a:xfrm>
           <a:prstGeom prst="ellipse">
@@ -18702,8 +18702,8 @@
         </p:nvSpPr>
         <p:spPr>
           <a:xfrm>
-            <a:off x="1932488" y="5974353"/>
-            <a:ext cx="418249" cy="319494"/>
+            <a:off x="3046174" y="6990944"/>
+            <a:ext cx="505638" cy="422697"/>
           </a:xfrm>
           <a:prstGeom prst="ellipse">
             <a:avLst/>

</xml_diff>